<commit_message>
prep for team meeting
</commit_message>
<xml_diff>
--- a/Presentations/Richard_LOOP_Mar2019.pptx
+++ b/Presentations/Richard_LOOP_Mar2019.pptx
@@ -227,7 +227,7 @@
           <a:p>
             <a:fld id="{58B8550F-FABF-41D5-8F91-EAEE78CB8230}" type="datetimeFigureOut">
               <a:rPr lang="en-CA" smtClean="0"/>
-              <a:t>2020-03-09</a:t>
+              <a:t>2020-05-13</a:t>
             </a:fld>
             <a:endParaRPr lang="en-CA"/>
           </a:p>
@@ -3010,13 +3010,8 @@
           <a:p>
             <a:r>
               <a:rPr lang="en-US" dirty="0"/>
-              <a:t>More detailed </a:t>
-            </a:r>
-            <a:r>
-              <a:rPr lang="en-US"/>
-              <a:t>stratigraphys</a:t>
-            </a:r>
-            <a:endParaRPr lang="en-US" dirty="0"/>
+              <a:t>More detailed stratigraphy</a:t>
+            </a:r>
           </a:p>
         </p:txBody>
       </p:sp>

</xml_diff>